<commit_message>
complete prediplom practice (download)
</commit_message>
<xml_diff>
--- a/prediplom_practice/Презентация_Преддипломная_практика_ИКБО-20-21_МухаметшинАР.pptx
+++ b/prediplom_practice/Презентация_Преддипломная_практика_ИКБО-20-21_МухаметшинАР.pptx
@@ -3995,8 +3995,8 @@
         </p:nvSpPr>
         <p:spPr bwMode="auto">
           <a:xfrm flipH="0" flipV="0">
-            <a:off x="2512818" y="3276595"/>
-            <a:ext cx="7779325" cy="744578"/>
+            <a:off x="2512818" y="3276594"/>
+            <a:ext cx="7784364" cy="744578"/>
           </a:xfrm>
           <a:prstGeom prst="rect">
             <a:avLst/>
@@ -4022,7 +4022,7 @@
                 <a:latin typeface="Times New Roman"/>
                 <a:cs typeface="Times New Roman"/>
               </a:rPr>
-              <a:t>     ТЕХНОЛОГИЧЕСКАЯ ПРАКТИКА</a:t>
+              <a:t>     ПРЕДДИПЛОМНАЯ ПРАКТИКА</a:t>
             </a:r>
             <a:endParaRPr sz="2400">
               <a:latin typeface="Times New Roman"/>
@@ -5528,7 +5528,7 @@
         <p:spPr bwMode="auto">
           <a:xfrm flipH="0" flipV="0">
             <a:off x="1975359" y="126546"/>
-            <a:ext cx="8160530" cy="378818"/>
+            <a:ext cx="8160529" cy="378818"/>
           </a:xfrm>
           <a:prstGeom prst="rect">
             <a:avLst/>
@@ -5612,7 +5612,7 @@
           <p:nvPr/>
         </p:nvGraphicFramePr>
         <p:xfrm>
-          <a:off x="766100" y="809139"/>
+          <a:off x="766100" y="809138"/>
           <a:ext cx="9572625" cy="5645431"/>
         </p:xfrm>
         <a:graphic>
@@ -6674,6 +6674,18 @@
                     </a:p>
                   </a:txBody>
                 </a:tc>
+                <a:tc>
+                  <a:txBody>
+                    <a:bodyPr/>
+                    <a:p>
+                      <a:pPr>
+                        <a:defRPr/>
+                      </a:pPr>
+                      <a:endParaRPr/>
+                    </a:p>
+                  </a:txBody>
+                  <a:tcPr/>
+                </a:tc>
               </a:tr>
               <a:tr h="738809">
                 <a:tc>
@@ -6776,6 +6788,18 @@
                     </a:p>
                   </a:txBody>
                 </a:tc>
+                <a:tc>
+                  <a:txBody>
+                    <a:bodyPr/>
+                    <a:p>
+                      <a:pPr>
+                        <a:defRPr/>
+                      </a:pPr>
+                      <a:endParaRPr/>
+                    </a:p>
+                  </a:txBody>
+                  <a:tcPr/>
+                </a:tc>
               </a:tr>
               <a:tr h="405836">
                 <a:tc gridSpan="4">
@@ -6881,6 +6905,18 @@
                     </a:p>
                   </a:txBody>
                 </a:tc>
+                <a:tc>
+                  <a:txBody>
+                    <a:bodyPr/>
+                    <a:p>
+                      <a:pPr>
+                        <a:defRPr/>
+                      </a:pPr>
+                      <a:endParaRPr/>
+                    </a:p>
+                  </a:txBody>
+                  <a:tcPr/>
+                </a:tc>
               </a:tr>
               <a:tr h="405836">
                 <a:tc>
@@ -6963,6 +6999,18 @@
                     </a:p>
                   </a:txBody>
                 </a:tc>
+                <a:tc>
+                  <a:txBody>
+                    <a:bodyPr/>
+                    <a:p>
+                      <a:pPr>
+                        <a:defRPr/>
+                      </a:pPr>
+                      <a:endParaRPr/>
+                    </a:p>
+                  </a:txBody>
+                  <a:tcPr/>
+                </a:tc>
               </a:tr>
               <a:tr h="572322">
                 <a:tc gridSpan="4">
@@ -7068,6 +7116,18 @@
                     </a:p>
                   </a:txBody>
                 </a:tc>
+                <a:tc>
+                  <a:txBody>
+                    <a:bodyPr/>
+                    <a:p>
+                      <a:pPr>
+                        <a:defRPr/>
+                      </a:pPr>
+                      <a:endParaRPr/>
+                    </a:p>
+                  </a:txBody>
+                  <a:tcPr/>
+                </a:tc>
               </a:tr>
               <a:tr h="960791">
                 <a:tc>
@@ -7150,6 +7210,18 @@
                     </a:p>
                   </a:txBody>
                 </a:tc>
+                <a:tc>
+                  <a:txBody>
+                    <a:bodyPr/>
+                    <a:p>
+                      <a:pPr>
+                        <a:defRPr/>
+                      </a:pPr>
+                      <a:endParaRPr/>
+                    </a:p>
+                  </a:txBody>
+                  <a:tcPr/>
+                </a:tc>
               </a:tr>
               <a:tr h="405836">
                 <a:tc>
@@ -7206,6 +7278,18 @@
                     </a:p>
                   </a:txBody>
                 </a:tc>
+                <a:tc>
+                  <a:txBody>
+                    <a:bodyPr/>
+                    <a:p>
+                      <a:pPr>
+                        <a:defRPr/>
+                      </a:pPr>
+                      <a:endParaRPr/>
+                    </a:p>
+                  </a:txBody>
+                  <a:tcPr/>
+                </a:tc>
               </a:tr>
               <a:tr h="627818">
                 <a:tc>
@@ -7287,6 +7371,18 @@
                       <a:endParaRPr/>
                     </a:p>
                   </a:txBody>
+                </a:tc>
+                <a:tc>
+                  <a:txBody>
+                    <a:bodyPr/>
+                    <a:p>
+                      <a:pPr>
+                        <a:defRPr/>
+                      </a:pPr>
+                      <a:endParaRPr/>
+                    </a:p>
+                  </a:txBody>
+                  <a:tcPr/>
                 </a:tc>
               </a:tr>
             </a:tbl>

</xml_diff>